<commit_message>
finished half of chpt 6
</commit_message>
<xml_diff>
--- a/book_cover/book_cover.pptx
+++ b/book_cover/book_cover.pptx
@@ -288,7 +288,7 @@
           <a:p>
             <a:fld id="{C40644A8-BA10-374A-8BA7-BF33A5A73F5D}" type="datetimeFigureOut">
               <a:rPr lang="en-US" smtClean="0"/>
-              <a:t>11/3/17</a:t>
+              <a:t>11/17/17</a:t>
             </a:fld>
             <a:endParaRPr lang="en-US"/>
           </a:p>
@@ -458,7 +458,7 @@
           <a:p>
             <a:fld id="{C40644A8-BA10-374A-8BA7-BF33A5A73F5D}" type="datetimeFigureOut">
               <a:rPr lang="en-US" smtClean="0"/>
-              <a:t>11/3/17</a:t>
+              <a:t>11/17/17</a:t>
             </a:fld>
             <a:endParaRPr lang="en-US"/>
           </a:p>
@@ -638,7 +638,7 @@
           <a:p>
             <a:fld id="{C40644A8-BA10-374A-8BA7-BF33A5A73F5D}" type="datetimeFigureOut">
               <a:rPr lang="en-US" smtClean="0"/>
-              <a:t>11/3/17</a:t>
+              <a:t>11/17/17</a:t>
             </a:fld>
             <a:endParaRPr lang="en-US"/>
           </a:p>
@@ -808,7 +808,7 @@
           <a:p>
             <a:fld id="{C40644A8-BA10-374A-8BA7-BF33A5A73F5D}" type="datetimeFigureOut">
               <a:rPr lang="en-US" smtClean="0"/>
-              <a:t>11/3/17</a:t>
+              <a:t>11/17/17</a:t>
             </a:fld>
             <a:endParaRPr lang="en-US"/>
           </a:p>
@@ -1054,7 +1054,7 @@
           <a:p>
             <a:fld id="{C40644A8-BA10-374A-8BA7-BF33A5A73F5D}" type="datetimeFigureOut">
               <a:rPr lang="en-US" smtClean="0"/>
-              <a:t>11/3/17</a:t>
+              <a:t>11/17/17</a:t>
             </a:fld>
             <a:endParaRPr lang="en-US"/>
           </a:p>
@@ -1342,7 +1342,7 @@
           <a:p>
             <a:fld id="{C40644A8-BA10-374A-8BA7-BF33A5A73F5D}" type="datetimeFigureOut">
               <a:rPr lang="en-US" smtClean="0"/>
-              <a:t>11/3/17</a:t>
+              <a:t>11/17/17</a:t>
             </a:fld>
             <a:endParaRPr lang="en-US"/>
           </a:p>
@@ -1764,7 +1764,7 @@
           <a:p>
             <a:fld id="{C40644A8-BA10-374A-8BA7-BF33A5A73F5D}" type="datetimeFigureOut">
               <a:rPr lang="en-US" smtClean="0"/>
-              <a:t>11/3/17</a:t>
+              <a:t>11/17/17</a:t>
             </a:fld>
             <a:endParaRPr lang="en-US"/>
           </a:p>
@@ -1882,7 +1882,7 @@
           <a:p>
             <a:fld id="{C40644A8-BA10-374A-8BA7-BF33A5A73F5D}" type="datetimeFigureOut">
               <a:rPr lang="en-US" smtClean="0"/>
-              <a:t>11/3/17</a:t>
+              <a:t>11/17/17</a:t>
             </a:fld>
             <a:endParaRPr lang="en-US"/>
           </a:p>
@@ -1977,7 +1977,7 @@
           <a:p>
             <a:fld id="{C40644A8-BA10-374A-8BA7-BF33A5A73F5D}" type="datetimeFigureOut">
               <a:rPr lang="en-US" smtClean="0"/>
-              <a:t>11/3/17</a:t>
+              <a:t>11/17/17</a:t>
             </a:fld>
             <a:endParaRPr lang="en-US"/>
           </a:p>
@@ -2254,7 +2254,7 @@
           <a:p>
             <a:fld id="{C40644A8-BA10-374A-8BA7-BF33A5A73F5D}" type="datetimeFigureOut">
               <a:rPr lang="en-US" smtClean="0"/>
-              <a:t>11/3/17</a:t>
+              <a:t>11/17/17</a:t>
             </a:fld>
             <a:endParaRPr lang="en-US"/>
           </a:p>
@@ -2507,7 +2507,7 @@
           <a:p>
             <a:fld id="{C40644A8-BA10-374A-8BA7-BF33A5A73F5D}" type="datetimeFigureOut">
               <a:rPr lang="en-US" smtClean="0"/>
-              <a:t>11/3/17</a:t>
+              <a:t>11/17/17</a:t>
             </a:fld>
             <a:endParaRPr lang="en-US"/>
           </a:p>
@@ -2720,7 +2720,7 @@
           <a:p>
             <a:fld id="{C40644A8-BA10-374A-8BA7-BF33A5A73F5D}" type="datetimeFigureOut">
               <a:rPr lang="en-US" smtClean="0"/>
-              <a:t>11/3/17</a:t>
+              <a:t>11/17/17</a:t>
             </a:fld>
             <a:endParaRPr lang="en-US"/>
           </a:p>
@@ -3152,7 +3152,27 @@
                 <a:latin typeface="Avenir Next Medium"/>
                 <a:cs typeface="Avenir Next Medium"/>
               </a:rPr>
-              <a:t>         DOUGLAS RUBIN PhD</a:t>
+              <a:t>         </a:t>
+            </a:r>
+            <a:r>
+              <a:rPr lang="en-US" sz="2000" b="1" dirty="0" smtClean="0">
+                <a:solidFill>
+                  <a:schemeClr val="bg1"/>
+                </a:solidFill>
+                <a:latin typeface="Avenir Next Medium"/>
+                <a:cs typeface="Avenir Next Medium"/>
+              </a:rPr>
+              <a:t> </a:t>
+            </a:r>
+            <a:r>
+              <a:rPr lang="en-US" sz="3000" b="1" dirty="0" smtClean="0">
+                <a:solidFill>
+                  <a:schemeClr val="bg1"/>
+                </a:solidFill>
+                <a:latin typeface="Avenir Next Medium"/>
+                <a:cs typeface="Avenir Next Medium"/>
+              </a:rPr>
+              <a:t>DOUGLAS RUBIN PhD</a:t>
             </a:r>
             <a:endParaRPr lang="en-US" sz="3000" b="1" dirty="0">
               <a:solidFill>
@@ -3210,8 +3230,8 @@
         </p:nvSpPr>
         <p:spPr>
           <a:xfrm>
-            <a:off x="867025" y="7528818"/>
-            <a:ext cx="6934200" cy="1077218"/>
+            <a:off x="955925" y="7528818"/>
+            <a:ext cx="6033308" cy="1077218"/>
           </a:xfrm>
           <a:prstGeom prst="rect">
             <a:avLst/>
@@ -3232,7 +3252,7 @@
                 <a:latin typeface="Avenir Black"/>
                 <a:cs typeface="Avenir Black"/>
               </a:rPr>
-              <a:t>Complete Solutions Guide to </a:t>
+              <a:t>A Complete Solutions Guide to </a:t>
             </a:r>
             <a:r>
               <a:rPr lang="en-US" sz="3200" b="1" dirty="0" err="1" smtClean="0">
@@ -3265,7 +3285,7 @@
         </p:nvSpPr>
         <p:spPr>
           <a:xfrm>
-            <a:off x="867026" y="8741499"/>
+            <a:off x="955926" y="8741499"/>
             <a:ext cx="4038600" cy="923330"/>
           </a:xfrm>
           <a:prstGeom prst="rect">
@@ -3306,7 +3326,7 @@
         </p:nvSpPr>
         <p:spPr>
           <a:xfrm>
-            <a:off x="638425" y="7657935"/>
+            <a:off x="727325" y="7657935"/>
             <a:ext cx="155448" cy="1655064"/>
           </a:xfrm>
           <a:prstGeom prst="rect">

</xml_diff>